<commit_message>
Update - Question & Takeaways
</commit_message>
<xml_diff>
--- a/Todd_Garner_DS6306_FLS_Week7_Part2.pptx
+++ b/Todd_Garner_DS6306_FLS_Week7_Part2.pptx
@@ -10,6 +10,8 @@
     <p:sldId id="258" r:id="rId4"/>
     <p:sldId id="259" r:id="rId5"/>
     <p:sldId id="260" r:id="rId6"/>
+    <p:sldId id="261" r:id="rId7"/>
+    <p:sldId id="262" r:id="rId8"/>
   </p:sldIdLst>
   <p:sldSz cx="12192000" cy="6858000"/>
   <p:notesSz cx="6858000" cy="9144000"/>
@@ -166,7 +168,7 @@
           <a:noFill/>
           <a:extLst>
             <a:ext uri="{909E8E84-426E-40dd-AFC4-6F175D3DCCD1}">
-              <a14:hiddenFill xmlns="" xmlns:a14="http://schemas.microsoft.com/office/drawing/2010/main">
+              <a14:hiddenFill xmlns:a14="http://schemas.microsoft.com/office/drawing/2010/main" xmlns="">
                 <a:solidFill>
                   <a:srgbClr val="FFFFFF"/>
                 </a:solidFill>
@@ -226,7 +228,7 @@
             </a:ln>
             <a:extLst>
               <a:ext uri="{91240B29-F687-4f45-9708-019B960494DF}">
-                <a14:hiddenLine xmlns="" xmlns:a14="http://schemas.microsoft.com/office/drawing/2010/main" w="9525">
+                <a14:hiddenLine xmlns:a14="http://schemas.microsoft.com/office/drawing/2010/main" xmlns="" w="9525">
                   <a:solidFill>
                     <a:srgbClr val="000000"/>
                   </a:solidFill>
@@ -316,7 +318,7 @@
             </a:ln>
             <a:extLst>
               <a:ext uri="{91240B29-F687-4f45-9708-019B960494DF}">
-                <a14:hiddenLine xmlns="" xmlns:a14="http://schemas.microsoft.com/office/drawing/2010/main" w="9525">
+                <a14:hiddenLine xmlns:a14="http://schemas.microsoft.com/office/drawing/2010/main" xmlns="" w="9525">
                   <a:solidFill>
                     <a:srgbClr val="000000"/>
                   </a:solidFill>
@@ -406,7 +408,7 @@
             </a:ln>
             <a:extLst>
               <a:ext uri="{91240B29-F687-4f45-9708-019B960494DF}">
-                <a14:hiddenLine xmlns="" xmlns:a14="http://schemas.microsoft.com/office/drawing/2010/main" w="9525">
+                <a14:hiddenLine xmlns:a14="http://schemas.microsoft.com/office/drawing/2010/main" xmlns="" w="9525">
                   <a:solidFill>
                     <a:srgbClr val="000000"/>
                   </a:solidFill>
@@ -440,7 +442,7 @@
             </a:ln>
             <a:extLst>
               <a:ext uri="{91240B29-F687-4f45-9708-019B960494DF}">
-                <a14:hiddenLine xmlns="" xmlns:a14="http://schemas.microsoft.com/office/drawing/2010/main" w="9525">
+                <a14:hiddenLine xmlns:a14="http://schemas.microsoft.com/office/drawing/2010/main" xmlns="" w="9525">
                   <a:solidFill>
                     <a:srgbClr val="000000"/>
                   </a:solidFill>
@@ -530,7 +532,7 @@
             </a:ln>
             <a:extLst>
               <a:ext uri="{91240B29-F687-4f45-9708-019B960494DF}">
-                <a14:hiddenLine xmlns="" xmlns:a14="http://schemas.microsoft.com/office/drawing/2010/main" w="9525">
+                <a14:hiddenLine xmlns:a14="http://schemas.microsoft.com/office/drawing/2010/main" xmlns="" w="9525">
                   <a:solidFill>
                     <a:srgbClr val="000000"/>
                   </a:solidFill>
@@ -592,7 +594,7 @@
             </a:ln>
             <a:extLst>
               <a:ext uri="{91240B29-F687-4f45-9708-019B960494DF}">
-                <a14:hiddenLine xmlns="" xmlns:a14="http://schemas.microsoft.com/office/drawing/2010/main" w="9525">
+                <a14:hiddenLine xmlns:a14="http://schemas.microsoft.com/office/drawing/2010/main" xmlns="" w="9525">
                   <a:solidFill>
                     <a:srgbClr val="000000"/>
                   </a:solidFill>
@@ -654,7 +656,7 @@
             </a:ln>
             <a:extLst>
               <a:ext uri="{91240B29-F687-4f45-9708-019B960494DF}">
-                <a14:hiddenLine xmlns="" xmlns:a14="http://schemas.microsoft.com/office/drawing/2010/main" w="9525">
+                <a14:hiddenLine xmlns:a14="http://schemas.microsoft.com/office/drawing/2010/main" xmlns="" w="9525">
                   <a:solidFill>
                     <a:srgbClr val="000000"/>
                   </a:solidFill>
@@ -744,7 +746,7 @@
             </a:ln>
             <a:extLst>
               <a:ext uri="{91240B29-F687-4f45-9708-019B960494DF}">
-                <a14:hiddenLine xmlns="" xmlns:a14="http://schemas.microsoft.com/office/drawing/2010/main" w="9525">
+                <a14:hiddenLine xmlns:a14="http://schemas.microsoft.com/office/drawing/2010/main" xmlns="" w="9525">
                   <a:solidFill>
                     <a:srgbClr val="000000"/>
                   </a:solidFill>
@@ -806,7 +808,7 @@
             </a:ln>
             <a:extLst>
               <a:ext uri="{91240B29-F687-4f45-9708-019B960494DF}">
-                <a14:hiddenLine xmlns="" xmlns:a14="http://schemas.microsoft.com/office/drawing/2010/main" w="9525">
+                <a14:hiddenLine xmlns:a14="http://schemas.microsoft.com/office/drawing/2010/main" xmlns="" w="9525">
                   <a:solidFill>
                     <a:srgbClr val="000000"/>
                   </a:solidFill>
@@ -868,7 +870,7 @@
             </a:ln>
             <a:extLst>
               <a:ext uri="{91240B29-F687-4f45-9708-019B960494DF}">
-                <a14:hiddenLine xmlns="" xmlns:a14="http://schemas.microsoft.com/office/drawing/2010/main" w="9525">
+                <a14:hiddenLine xmlns:a14="http://schemas.microsoft.com/office/drawing/2010/main" xmlns="" w="9525">
                   <a:solidFill>
                     <a:srgbClr val="000000"/>
                   </a:solidFill>
@@ -958,7 +960,7 @@
             </a:ln>
             <a:extLst>
               <a:ext uri="{91240B29-F687-4f45-9708-019B960494DF}">
-                <a14:hiddenLine xmlns="" xmlns:a14="http://schemas.microsoft.com/office/drawing/2010/main" w="9525">
+                <a14:hiddenLine xmlns:a14="http://schemas.microsoft.com/office/drawing/2010/main" xmlns="" w="9525">
                   <a:solidFill>
                     <a:srgbClr val="000000"/>
                   </a:solidFill>
@@ -1048,7 +1050,7 @@
             </a:ln>
             <a:extLst>
               <a:ext uri="{91240B29-F687-4f45-9708-019B960494DF}">
-                <a14:hiddenLine xmlns="" xmlns:a14="http://schemas.microsoft.com/office/drawing/2010/main" w="9525">
+                <a14:hiddenLine xmlns:a14="http://schemas.microsoft.com/office/drawing/2010/main" xmlns="" w="9525">
                   <a:solidFill>
                     <a:srgbClr val="000000"/>
                   </a:solidFill>
@@ -1110,7 +1112,7 @@
             </a:ln>
             <a:extLst>
               <a:ext uri="{91240B29-F687-4f45-9708-019B960494DF}">
-                <a14:hiddenLine xmlns="" xmlns:a14="http://schemas.microsoft.com/office/drawing/2010/main" w="9525">
+                <a14:hiddenLine xmlns:a14="http://schemas.microsoft.com/office/drawing/2010/main" xmlns="" w="9525">
                   <a:solidFill>
                     <a:srgbClr val="000000"/>
                   </a:solidFill>
@@ -1220,7 +1222,7 @@
             </a:ln>
             <a:extLst>
               <a:ext uri="{91240B29-F687-4f45-9708-019B960494DF}">
-                <a14:hiddenLine xmlns="" xmlns:a14="http://schemas.microsoft.com/office/drawing/2010/main" w="9525">
+                <a14:hiddenLine xmlns:a14="http://schemas.microsoft.com/office/drawing/2010/main" xmlns="" w="9525">
                   <a:solidFill>
                     <a:srgbClr val="000000"/>
                   </a:solidFill>
@@ -1282,7 +1284,7 @@
             </a:ln>
             <a:extLst>
               <a:ext uri="{91240B29-F687-4f45-9708-019B960494DF}">
-                <a14:hiddenLine xmlns="" xmlns:a14="http://schemas.microsoft.com/office/drawing/2010/main" w="9525">
+                <a14:hiddenLine xmlns:a14="http://schemas.microsoft.com/office/drawing/2010/main" xmlns="" w="9525">
                   <a:solidFill>
                     <a:srgbClr val="000000"/>
                   </a:solidFill>
@@ -1372,7 +1374,7 @@
             </a:ln>
             <a:extLst>
               <a:ext uri="{91240B29-F687-4f45-9708-019B960494DF}">
-                <a14:hiddenLine xmlns="" xmlns:a14="http://schemas.microsoft.com/office/drawing/2010/main" w="9525">
+                <a14:hiddenLine xmlns:a14="http://schemas.microsoft.com/office/drawing/2010/main" xmlns="" w="9525">
                   <a:solidFill>
                     <a:srgbClr val="000000"/>
                   </a:solidFill>
@@ -1462,7 +1464,7 @@
             </a:ln>
             <a:extLst>
               <a:ext uri="{91240B29-F687-4f45-9708-019B960494DF}">
-                <a14:hiddenLine xmlns="" xmlns:a14="http://schemas.microsoft.com/office/drawing/2010/main" w="9525">
+                <a14:hiddenLine xmlns:a14="http://schemas.microsoft.com/office/drawing/2010/main" xmlns="" w="9525">
                   <a:solidFill>
                     <a:srgbClr val="000000"/>
                   </a:solidFill>
@@ -1524,7 +1526,7 @@
             </a:ln>
             <a:extLst>
               <a:ext uri="{91240B29-F687-4f45-9708-019B960494DF}">
-                <a14:hiddenLine xmlns="" xmlns:a14="http://schemas.microsoft.com/office/drawing/2010/main" w="9525">
+                <a14:hiddenLine xmlns:a14="http://schemas.microsoft.com/office/drawing/2010/main" xmlns="" w="9525">
                   <a:solidFill>
                     <a:srgbClr val="000000"/>
                   </a:solidFill>
@@ -1614,7 +1616,7 @@
             </a:ln>
             <a:extLst>
               <a:ext uri="{91240B29-F687-4f45-9708-019B960494DF}">
-                <a14:hiddenLine xmlns="" xmlns:a14="http://schemas.microsoft.com/office/drawing/2010/main" w="9525">
+                <a14:hiddenLine xmlns:a14="http://schemas.microsoft.com/office/drawing/2010/main" xmlns="" w="9525">
                   <a:solidFill>
                     <a:srgbClr val="000000"/>
                   </a:solidFill>
@@ -1704,7 +1706,7 @@
             </a:ln>
             <a:extLst>
               <a:ext uri="{91240B29-F687-4f45-9708-019B960494DF}">
-                <a14:hiddenLine xmlns="" xmlns:a14="http://schemas.microsoft.com/office/drawing/2010/main" w="9525">
+                <a14:hiddenLine xmlns:a14="http://schemas.microsoft.com/office/drawing/2010/main" xmlns="" w="9525">
                   <a:solidFill>
                     <a:srgbClr val="000000"/>
                   </a:solidFill>
@@ -1760,7 +1762,7 @@
             </a:ln>
             <a:extLst>
               <a:ext uri="{91240B29-F687-4f45-9708-019B960494DF}">
-                <a14:hiddenLine xmlns="" xmlns:a14="http://schemas.microsoft.com/office/drawing/2010/main" w="9525">
+                <a14:hiddenLine xmlns:a14="http://schemas.microsoft.com/office/drawing/2010/main" xmlns="" w="9525">
                   <a:solidFill>
                     <a:srgbClr val="000000"/>
                   </a:solidFill>
@@ -1850,7 +1852,7 @@
             </a:ln>
             <a:extLst>
               <a:ext uri="{91240B29-F687-4f45-9708-019B960494DF}">
-                <a14:hiddenLine xmlns="" xmlns:a14="http://schemas.microsoft.com/office/drawing/2010/main" w="9525">
+                <a14:hiddenLine xmlns:a14="http://schemas.microsoft.com/office/drawing/2010/main" xmlns="" w="9525">
                   <a:solidFill>
                     <a:srgbClr val="000000"/>
                   </a:solidFill>
@@ -1906,7 +1908,7 @@
             </a:ln>
             <a:extLst>
               <a:ext uri="{91240B29-F687-4f45-9708-019B960494DF}">
-                <a14:hiddenLine xmlns="" xmlns:a14="http://schemas.microsoft.com/office/drawing/2010/main" w="9525">
+                <a14:hiddenLine xmlns:a14="http://schemas.microsoft.com/office/drawing/2010/main" xmlns="" w="9525">
                   <a:solidFill>
                     <a:srgbClr val="000000"/>
                   </a:solidFill>
@@ -1996,7 +1998,7 @@
             </a:ln>
             <a:extLst>
               <a:ext uri="{91240B29-F687-4f45-9708-019B960494DF}">
-                <a14:hiddenLine xmlns="" xmlns:a14="http://schemas.microsoft.com/office/drawing/2010/main" w="9525">
+                <a14:hiddenLine xmlns:a14="http://schemas.microsoft.com/office/drawing/2010/main" xmlns="" w="9525">
                   <a:solidFill>
                     <a:srgbClr val="000000"/>
                   </a:solidFill>
@@ -2064,7 +2066,7 @@
             </a:ln>
             <a:extLst>
               <a:ext uri="{91240B29-F687-4f45-9708-019B960494DF}">
-                <a14:hiddenLine xmlns="" xmlns:a14="http://schemas.microsoft.com/office/drawing/2010/main" w="9525">
+                <a14:hiddenLine xmlns:a14="http://schemas.microsoft.com/office/drawing/2010/main" xmlns="" w="9525">
                   <a:solidFill>
                     <a:srgbClr val="000000"/>
                   </a:solidFill>
@@ -2154,7 +2156,7 @@
             </a:ln>
             <a:extLst>
               <a:ext uri="{91240B29-F687-4f45-9708-019B960494DF}">
-                <a14:hiddenLine xmlns="" xmlns:a14="http://schemas.microsoft.com/office/drawing/2010/main" w="9525">
+                <a14:hiddenLine xmlns:a14="http://schemas.microsoft.com/office/drawing/2010/main" xmlns="" w="9525">
                   <a:solidFill>
                     <a:srgbClr val="000000"/>
                   </a:solidFill>
@@ -2222,7 +2224,7 @@
             </a:ln>
             <a:extLst>
               <a:ext uri="{91240B29-F687-4f45-9708-019B960494DF}">
-                <a14:hiddenLine xmlns="" xmlns:a14="http://schemas.microsoft.com/office/drawing/2010/main" w="9525">
+                <a14:hiddenLine xmlns:a14="http://schemas.microsoft.com/office/drawing/2010/main" xmlns="" w="9525">
                   <a:solidFill>
                     <a:srgbClr val="000000"/>
                   </a:solidFill>
@@ -2312,7 +2314,7 @@
             </a:ln>
             <a:extLst>
               <a:ext uri="{91240B29-F687-4f45-9708-019B960494DF}">
-                <a14:hiddenLine xmlns="" xmlns:a14="http://schemas.microsoft.com/office/drawing/2010/main" w="9525">
+                <a14:hiddenLine xmlns:a14="http://schemas.microsoft.com/office/drawing/2010/main" xmlns="" w="9525">
                   <a:solidFill>
                     <a:srgbClr val="000000"/>
                   </a:solidFill>
@@ -2346,7 +2348,7 @@
             </a:ln>
             <a:extLst>
               <a:ext uri="{91240B29-F687-4f45-9708-019B960494DF}">
-                <a14:hiddenLine xmlns="" xmlns:a14="http://schemas.microsoft.com/office/drawing/2010/main" w="9525">
+                <a14:hiddenLine xmlns:a14="http://schemas.microsoft.com/office/drawing/2010/main" xmlns="" w="9525">
                   <a:solidFill>
                     <a:srgbClr val="000000"/>
                   </a:solidFill>
@@ -2436,7 +2438,7 @@
             </a:ln>
             <a:extLst>
               <a:ext uri="{91240B29-F687-4f45-9708-019B960494DF}">
-                <a14:hiddenLine xmlns="" xmlns:a14="http://schemas.microsoft.com/office/drawing/2010/main" w="9525">
+                <a14:hiddenLine xmlns:a14="http://schemas.microsoft.com/office/drawing/2010/main" xmlns="" w="9525">
                   <a:solidFill>
                     <a:srgbClr val="000000"/>
                   </a:solidFill>
@@ -2498,7 +2500,7 @@
             </a:ln>
             <a:extLst>
               <a:ext uri="{91240B29-F687-4f45-9708-019B960494DF}">
-                <a14:hiddenLine xmlns="" xmlns:a14="http://schemas.microsoft.com/office/drawing/2010/main" w="9525">
+                <a14:hiddenLine xmlns:a14="http://schemas.microsoft.com/office/drawing/2010/main" xmlns="" w="9525">
                   <a:solidFill>
                     <a:srgbClr val="000000"/>
                   </a:solidFill>
@@ -2560,7 +2562,7 @@
             </a:ln>
             <a:extLst>
               <a:ext uri="{91240B29-F687-4f45-9708-019B960494DF}">
-                <a14:hiddenLine xmlns="" xmlns:a14="http://schemas.microsoft.com/office/drawing/2010/main" w="9525">
+                <a14:hiddenLine xmlns:a14="http://schemas.microsoft.com/office/drawing/2010/main" xmlns="" w="9525">
                   <a:solidFill>
                     <a:srgbClr val="000000"/>
                   </a:solidFill>
@@ -2650,7 +2652,7 @@
             </a:ln>
             <a:extLst>
               <a:ext uri="{91240B29-F687-4f45-9708-019B960494DF}">
-                <a14:hiddenLine xmlns="" xmlns:a14="http://schemas.microsoft.com/office/drawing/2010/main" w="9525">
+                <a14:hiddenLine xmlns:a14="http://schemas.microsoft.com/office/drawing/2010/main" xmlns="" w="9525">
                   <a:solidFill>
                     <a:srgbClr val="000000"/>
                   </a:solidFill>
@@ -2718,7 +2720,7 @@
             </a:ln>
             <a:extLst>
               <a:ext uri="{91240B29-F687-4f45-9708-019B960494DF}">
-                <a14:hiddenLine xmlns="" xmlns:a14="http://schemas.microsoft.com/office/drawing/2010/main" w="9525">
+                <a14:hiddenLine xmlns:a14="http://schemas.microsoft.com/office/drawing/2010/main" xmlns="" w="9525">
                   <a:solidFill>
                     <a:srgbClr val="000000"/>
                   </a:solidFill>
@@ -2780,7 +2782,7 @@
             </a:ln>
             <a:extLst>
               <a:ext uri="{91240B29-F687-4f45-9708-019B960494DF}">
-                <a14:hiddenLine xmlns="" xmlns:a14="http://schemas.microsoft.com/office/drawing/2010/main" w="9525">
+                <a14:hiddenLine xmlns:a14="http://schemas.microsoft.com/office/drawing/2010/main" xmlns="" w="9525">
                   <a:solidFill>
                     <a:srgbClr val="000000"/>
                   </a:solidFill>
@@ -2870,7 +2872,7 @@
             </a:ln>
             <a:extLst>
               <a:ext uri="{91240B29-F687-4f45-9708-019B960494DF}">
-                <a14:hiddenLine xmlns="" xmlns:a14="http://schemas.microsoft.com/office/drawing/2010/main" w="9525">
+                <a14:hiddenLine xmlns:a14="http://schemas.microsoft.com/office/drawing/2010/main" xmlns="" w="9525">
                   <a:solidFill>
                     <a:srgbClr val="000000"/>
                   </a:solidFill>
@@ -2932,7 +2934,7 @@
             </a:ln>
             <a:extLst>
               <a:ext uri="{91240B29-F687-4f45-9708-019B960494DF}">
-                <a14:hiddenLine xmlns="" xmlns:a14="http://schemas.microsoft.com/office/drawing/2010/main" w="9525">
+                <a14:hiddenLine xmlns:a14="http://schemas.microsoft.com/office/drawing/2010/main" xmlns="" w="9525">
                   <a:solidFill>
                     <a:srgbClr val="000000"/>
                   </a:solidFill>
@@ -3022,7 +3024,7 @@
             </a:ln>
             <a:extLst>
               <a:ext uri="{91240B29-F687-4f45-9708-019B960494DF}">
-                <a14:hiddenLine xmlns="" xmlns:a14="http://schemas.microsoft.com/office/drawing/2010/main" w="9525">
+                <a14:hiddenLine xmlns:a14="http://schemas.microsoft.com/office/drawing/2010/main" xmlns="" w="9525">
                   <a:solidFill>
                     <a:srgbClr val="000000"/>
                   </a:solidFill>
@@ -3084,7 +3086,7 @@
             </a:ln>
             <a:extLst>
               <a:ext uri="{91240B29-F687-4f45-9708-019B960494DF}">
-                <a14:hiddenLine xmlns="" xmlns:a14="http://schemas.microsoft.com/office/drawing/2010/main" w="9525">
+                <a14:hiddenLine xmlns:a14="http://schemas.microsoft.com/office/drawing/2010/main" xmlns="" w="9525">
                   <a:solidFill>
                     <a:srgbClr val="000000"/>
                   </a:solidFill>
@@ -3174,7 +3176,7 @@
             </a:ln>
             <a:extLst>
               <a:ext uri="{91240B29-F687-4f45-9708-019B960494DF}">
-                <a14:hiddenLine xmlns="" xmlns:a14="http://schemas.microsoft.com/office/drawing/2010/main" w="9525">
+                <a14:hiddenLine xmlns:a14="http://schemas.microsoft.com/office/drawing/2010/main" xmlns="" w="9525">
                   <a:solidFill>
                     <a:srgbClr val="000000"/>
                   </a:solidFill>
@@ -3208,7 +3210,7 @@
             </a:ln>
             <a:extLst>
               <a:ext uri="{91240B29-F687-4f45-9708-019B960494DF}">
-                <a14:hiddenLine xmlns="" xmlns:a14="http://schemas.microsoft.com/office/drawing/2010/main" w="9525">
+                <a14:hiddenLine xmlns:a14="http://schemas.microsoft.com/office/drawing/2010/main" xmlns="" w="9525">
                   <a:solidFill>
                     <a:srgbClr val="000000"/>
                   </a:solidFill>
@@ -3273,7 +3275,7 @@
             </a:ln>
             <a:extLst>
               <a:ext uri="{91240B29-F687-4f45-9708-019B960494DF}">
-                <a14:hiddenLine xmlns="" xmlns:a14="http://schemas.microsoft.com/office/drawing/2010/main" w="9525">
+                <a14:hiddenLine xmlns:a14="http://schemas.microsoft.com/office/drawing/2010/main" xmlns="" w="9525">
                   <a:solidFill>
                     <a:srgbClr val="000000"/>
                   </a:solidFill>
@@ -3363,7 +3365,7 @@
             </a:ln>
             <a:extLst>
               <a:ext uri="{91240B29-F687-4f45-9708-019B960494DF}">
-                <a14:hiddenLine xmlns="" xmlns:a14="http://schemas.microsoft.com/office/drawing/2010/main" w="9525">
+                <a14:hiddenLine xmlns:a14="http://schemas.microsoft.com/office/drawing/2010/main" xmlns="" w="9525">
                   <a:solidFill>
                     <a:srgbClr val="000000"/>
                   </a:solidFill>
@@ -3425,7 +3427,7 @@
             </a:ln>
             <a:extLst>
               <a:ext uri="{91240B29-F687-4f45-9708-019B960494DF}">
-                <a14:hiddenLine xmlns="" xmlns:a14="http://schemas.microsoft.com/office/drawing/2010/main" w="9525">
+                <a14:hiddenLine xmlns:a14="http://schemas.microsoft.com/office/drawing/2010/main" xmlns="" w="9525">
                   <a:solidFill>
                     <a:srgbClr val="000000"/>
                   </a:solidFill>
@@ -3515,7 +3517,7 @@
             </a:ln>
             <a:extLst>
               <a:ext uri="{91240B29-F687-4f45-9708-019B960494DF}">
-                <a14:hiddenLine xmlns="" xmlns:a14="http://schemas.microsoft.com/office/drawing/2010/main" w="9525">
+                <a14:hiddenLine xmlns:a14="http://schemas.microsoft.com/office/drawing/2010/main" xmlns="" w="9525">
                   <a:solidFill>
                     <a:srgbClr val="000000"/>
                   </a:solidFill>
@@ -3605,7 +3607,7 @@
             </a:ln>
             <a:extLst>
               <a:ext uri="{91240B29-F687-4f45-9708-019B960494DF}">
-                <a14:hiddenLine xmlns="" xmlns:a14="http://schemas.microsoft.com/office/drawing/2010/main" w="9525">
+                <a14:hiddenLine xmlns:a14="http://schemas.microsoft.com/office/drawing/2010/main" xmlns="" w="9525">
                   <a:solidFill>
                     <a:srgbClr val="000000"/>
                   </a:solidFill>
@@ -3670,7 +3672,7 @@
             </a:ln>
             <a:extLst>
               <a:ext uri="{91240B29-F687-4f45-9708-019B960494DF}">
-                <a14:hiddenLine xmlns="" xmlns:a14="http://schemas.microsoft.com/office/drawing/2010/main" w="9525">
+                <a14:hiddenLine xmlns:a14="http://schemas.microsoft.com/office/drawing/2010/main" xmlns="" w="9525">
                   <a:solidFill>
                     <a:srgbClr val="000000"/>
                   </a:solidFill>
@@ -3732,7 +3734,7 @@
             </a:ln>
             <a:extLst>
               <a:ext uri="{91240B29-F687-4f45-9708-019B960494DF}">
-                <a14:hiddenLine xmlns="" xmlns:a14="http://schemas.microsoft.com/office/drawing/2010/main" w="9525">
+                <a14:hiddenLine xmlns:a14="http://schemas.microsoft.com/office/drawing/2010/main" xmlns="" w="9525">
                   <a:solidFill>
                     <a:srgbClr val="000000"/>
                   </a:solidFill>
@@ -3822,7 +3824,7 @@
             </a:ln>
             <a:extLst>
               <a:ext uri="{91240B29-F687-4f45-9708-019B960494DF}">
-                <a14:hiddenLine xmlns="" xmlns:a14="http://schemas.microsoft.com/office/drawing/2010/main" w="9525">
+                <a14:hiddenLine xmlns:a14="http://schemas.microsoft.com/office/drawing/2010/main" xmlns="" w="9525">
                   <a:solidFill>
                     <a:srgbClr val="000000"/>
                   </a:solidFill>
@@ -3912,7 +3914,7 @@
             </a:ln>
             <a:extLst>
               <a:ext uri="{91240B29-F687-4f45-9708-019B960494DF}">
-                <a14:hiddenLine xmlns="" xmlns:a14="http://schemas.microsoft.com/office/drawing/2010/main" w="9525">
+                <a14:hiddenLine xmlns:a14="http://schemas.microsoft.com/office/drawing/2010/main" xmlns="" w="9525">
                   <a:solidFill>
                     <a:srgbClr val="000000"/>
                   </a:solidFill>
@@ -3974,7 +3976,7 @@
             </a:ln>
             <a:extLst>
               <a:ext uri="{91240B29-F687-4f45-9708-019B960494DF}">
-                <a14:hiddenLine xmlns="" xmlns:a14="http://schemas.microsoft.com/office/drawing/2010/main" w="9525">
+                <a14:hiddenLine xmlns:a14="http://schemas.microsoft.com/office/drawing/2010/main" xmlns="" w="9525">
                   <a:solidFill>
                     <a:srgbClr val="000000"/>
                   </a:solidFill>
@@ -4094,7 +4096,7 @@
             </a:ln>
             <a:extLst>
               <a:ext uri="{91240B29-F687-4f45-9708-019B960494DF}">
-                <a14:hiddenLine xmlns="" xmlns:a14="http://schemas.microsoft.com/office/drawing/2010/main" w="9525">
+                <a14:hiddenLine xmlns:a14="http://schemas.microsoft.com/office/drawing/2010/main" xmlns="" w="9525">
                   <a:solidFill>
                     <a:srgbClr val="000000"/>
                   </a:solidFill>
@@ -4162,7 +4164,7 @@
             </a:ln>
             <a:extLst>
               <a:ext uri="{91240B29-F687-4f45-9708-019B960494DF}">
-                <a14:hiddenLine xmlns="" xmlns:a14="http://schemas.microsoft.com/office/drawing/2010/main" w="9525">
+                <a14:hiddenLine xmlns:a14="http://schemas.microsoft.com/office/drawing/2010/main" xmlns="" w="9525">
                   <a:solidFill>
                     <a:srgbClr val="000000"/>
                   </a:solidFill>
@@ -4252,7 +4254,7 @@
             </a:ln>
             <a:extLst>
               <a:ext uri="{91240B29-F687-4f45-9708-019B960494DF}">
-                <a14:hiddenLine xmlns="" xmlns:a14="http://schemas.microsoft.com/office/drawing/2010/main" w="9525">
+                <a14:hiddenLine xmlns:a14="http://schemas.microsoft.com/office/drawing/2010/main" xmlns="" w="9525">
                   <a:solidFill>
                     <a:srgbClr val="000000"/>
                   </a:solidFill>
@@ -8974,7 +8976,7 @@
           <a:noFill/>
           <a:extLst>
             <a:ext uri="{909E8E84-426E-40dd-AFC4-6F175D3DCCD1}">
-              <a14:hiddenFill xmlns="" xmlns:a14="http://schemas.microsoft.com/office/drawing/2010/main">
+              <a14:hiddenFill xmlns:a14="http://schemas.microsoft.com/office/drawing/2010/main" xmlns="">
                 <a:solidFill>
                   <a:srgbClr val="FFFFFF"/>
                 </a:solidFill>
@@ -9048,7 +9050,7 @@
               </a:ln>
               <a:extLst>
                 <a:ext uri="{91240B29-F687-4f45-9708-019B960494DF}">
-                  <a14:hiddenLine xmlns="" xmlns:a14="http://schemas.microsoft.com/office/drawing/2010/main" w="9525">
+                  <a14:hiddenLine xmlns:a14="http://schemas.microsoft.com/office/drawing/2010/main" xmlns="" w="9525">
                     <a:solidFill>
                       <a:srgbClr val="000000"/>
                     </a:solidFill>
@@ -9138,7 +9140,7 @@
               </a:ln>
               <a:extLst>
                 <a:ext uri="{91240B29-F687-4f45-9708-019B960494DF}">
-                  <a14:hiddenLine xmlns="" xmlns:a14="http://schemas.microsoft.com/office/drawing/2010/main" w="9525">
+                  <a14:hiddenLine xmlns:a14="http://schemas.microsoft.com/office/drawing/2010/main" xmlns="" w="9525">
                     <a:solidFill>
                       <a:srgbClr val="000000"/>
                     </a:solidFill>
@@ -9228,7 +9230,7 @@
               </a:ln>
               <a:extLst>
                 <a:ext uri="{91240B29-F687-4f45-9708-019B960494DF}">
-                  <a14:hiddenLine xmlns="" xmlns:a14="http://schemas.microsoft.com/office/drawing/2010/main" w="9525">
+                  <a14:hiddenLine xmlns:a14="http://schemas.microsoft.com/office/drawing/2010/main" xmlns="" w="9525">
                     <a:solidFill>
                       <a:srgbClr val="000000"/>
                     </a:solidFill>
@@ -9290,7 +9292,7 @@
               </a:ln>
               <a:extLst>
                 <a:ext uri="{91240B29-F687-4f45-9708-019B960494DF}">
-                  <a14:hiddenLine xmlns="" xmlns:a14="http://schemas.microsoft.com/office/drawing/2010/main" w="9525">
+                  <a14:hiddenLine xmlns:a14="http://schemas.microsoft.com/office/drawing/2010/main" xmlns="" w="9525">
                     <a:solidFill>
                       <a:srgbClr val="000000"/>
                     </a:solidFill>
@@ -9380,7 +9382,7 @@
               </a:ln>
               <a:extLst>
                 <a:ext uri="{91240B29-F687-4f45-9708-019B960494DF}">
-                  <a14:hiddenLine xmlns="" xmlns:a14="http://schemas.microsoft.com/office/drawing/2010/main" w="9525">
+                  <a14:hiddenLine xmlns:a14="http://schemas.microsoft.com/office/drawing/2010/main" xmlns="" w="9525">
                     <a:solidFill>
                       <a:srgbClr val="000000"/>
                     </a:solidFill>
@@ -9442,7 +9444,7 @@
               </a:ln>
               <a:extLst>
                 <a:ext uri="{91240B29-F687-4f45-9708-019B960494DF}">
-                  <a14:hiddenLine xmlns="" xmlns:a14="http://schemas.microsoft.com/office/drawing/2010/main" w="9525">
+                  <a14:hiddenLine xmlns:a14="http://schemas.microsoft.com/office/drawing/2010/main" xmlns="" w="9525">
                     <a:solidFill>
                       <a:srgbClr val="000000"/>
                     </a:solidFill>
@@ -9504,7 +9506,7 @@
               </a:ln>
               <a:extLst>
                 <a:ext uri="{91240B29-F687-4f45-9708-019B960494DF}">
-                  <a14:hiddenLine xmlns="" xmlns:a14="http://schemas.microsoft.com/office/drawing/2010/main" w="9525">
+                  <a14:hiddenLine xmlns:a14="http://schemas.microsoft.com/office/drawing/2010/main" xmlns="" w="9525">
                     <a:solidFill>
                       <a:srgbClr val="000000"/>
                     </a:solidFill>
@@ -9594,7 +9596,7 @@
               </a:ln>
               <a:extLst>
                 <a:ext uri="{91240B29-F687-4f45-9708-019B960494DF}">
-                  <a14:hiddenLine xmlns="" xmlns:a14="http://schemas.microsoft.com/office/drawing/2010/main" w="9525">
+                  <a14:hiddenLine xmlns:a14="http://schemas.microsoft.com/office/drawing/2010/main" xmlns="" w="9525">
                     <a:solidFill>
                       <a:srgbClr val="000000"/>
                     </a:solidFill>
@@ -9684,7 +9686,7 @@
               </a:ln>
               <a:extLst>
                 <a:ext uri="{91240B29-F687-4f45-9708-019B960494DF}">
-                  <a14:hiddenLine xmlns="" xmlns:a14="http://schemas.microsoft.com/office/drawing/2010/main" w="9525">
+                  <a14:hiddenLine xmlns:a14="http://schemas.microsoft.com/office/drawing/2010/main" xmlns="" w="9525">
                     <a:solidFill>
                       <a:srgbClr val="000000"/>
                     </a:solidFill>
@@ -9746,7 +9748,7 @@
               </a:ln>
               <a:extLst>
                 <a:ext uri="{91240B29-F687-4f45-9708-019B960494DF}">
-                  <a14:hiddenLine xmlns="" xmlns:a14="http://schemas.microsoft.com/office/drawing/2010/main" w="9525">
+                  <a14:hiddenLine xmlns:a14="http://schemas.microsoft.com/office/drawing/2010/main" xmlns="" w="9525">
                     <a:solidFill>
                       <a:srgbClr val="000000"/>
                     </a:solidFill>
@@ -9856,7 +9858,7 @@
               </a:ln>
               <a:extLst>
                 <a:ext uri="{91240B29-F687-4f45-9708-019B960494DF}">
-                  <a14:hiddenLine xmlns="" xmlns:a14="http://schemas.microsoft.com/office/drawing/2010/main" w="9525">
+                  <a14:hiddenLine xmlns:a14="http://schemas.microsoft.com/office/drawing/2010/main" xmlns="" w="9525">
                     <a:solidFill>
                       <a:srgbClr val="000000"/>
                     </a:solidFill>
@@ -9940,7 +9942,7 @@
               </a:ln>
               <a:extLst>
                 <a:ext uri="{91240B29-F687-4f45-9708-019B960494DF}">
-                  <a14:hiddenLine xmlns="" xmlns:a14="http://schemas.microsoft.com/office/drawing/2010/main" w="9525">
+                  <a14:hiddenLine xmlns:a14="http://schemas.microsoft.com/office/drawing/2010/main" xmlns="" w="9525">
                     <a:solidFill>
                       <a:srgbClr val="000000"/>
                     </a:solidFill>
@@ -10002,7 +10004,7 @@
               </a:ln>
               <a:extLst>
                 <a:ext uri="{91240B29-F687-4f45-9708-019B960494DF}">
-                  <a14:hiddenLine xmlns="" xmlns:a14="http://schemas.microsoft.com/office/drawing/2010/main" w="9525">
+                  <a14:hiddenLine xmlns:a14="http://schemas.microsoft.com/office/drawing/2010/main" xmlns="" w="9525">
                     <a:solidFill>
                       <a:srgbClr val="000000"/>
                     </a:solidFill>
@@ -10064,7 +10066,7 @@
               </a:ln>
               <a:extLst>
                 <a:ext uri="{91240B29-F687-4f45-9708-019B960494DF}">
-                  <a14:hiddenLine xmlns="" xmlns:a14="http://schemas.microsoft.com/office/drawing/2010/main" w="9525">
+                  <a14:hiddenLine xmlns:a14="http://schemas.microsoft.com/office/drawing/2010/main" xmlns="" w="9525">
                     <a:solidFill>
                       <a:srgbClr val="000000"/>
                     </a:solidFill>
@@ -10154,7 +10156,7 @@
               </a:ln>
               <a:extLst>
                 <a:ext uri="{91240B29-F687-4f45-9708-019B960494DF}">
-                  <a14:hiddenLine xmlns="" xmlns:a14="http://schemas.microsoft.com/office/drawing/2010/main" w="9525">
+                  <a14:hiddenLine xmlns:a14="http://schemas.microsoft.com/office/drawing/2010/main" xmlns="" w="9525">
                     <a:solidFill>
                       <a:srgbClr val="000000"/>
                     </a:solidFill>
@@ -10188,7 +10190,7 @@
               </a:ln>
               <a:extLst>
                 <a:ext uri="{91240B29-F687-4f45-9708-019B960494DF}">
-                  <a14:hiddenLine xmlns="" xmlns:a14="http://schemas.microsoft.com/office/drawing/2010/main" w="9525">
+                  <a14:hiddenLine xmlns:a14="http://schemas.microsoft.com/office/drawing/2010/main" xmlns="" w="9525">
                     <a:solidFill>
                       <a:srgbClr val="000000"/>
                     </a:solidFill>
@@ -10253,7 +10255,7 @@
               </a:ln>
               <a:extLst>
                 <a:ext uri="{91240B29-F687-4f45-9708-019B960494DF}">
-                  <a14:hiddenLine xmlns="" xmlns:a14="http://schemas.microsoft.com/office/drawing/2010/main" w="9525">
+                  <a14:hiddenLine xmlns:a14="http://schemas.microsoft.com/office/drawing/2010/main" xmlns="" w="9525">
                     <a:solidFill>
                       <a:srgbClr val="000000"/>
                     </a:solidFill>
@@ -10343,7 +10345,7 @@
               </a:ln>
               <a:extLst>
                 <a:ext uri="{91240B29-F687-4f45-9708-019B960494DF}">
-                  <a14:hiddenLine xmlns="" xmlns:a14="http://schemas.microsoft.com/office/drawing/2010/main" w="9525">
+                  <a14:hiddenLine xmlns:a14="http://schemas.microsoft.com/office/drawing/2010/main" xmlns="" w="9525">
                     <a:solidFill>
                       <a:srgbClr val="000000"/>
                     </a:solidFill>
@@ -10405,7 +10407,7 @@
               </a:ln>
               <a:extLst>
                 <a:ext uri="{91240B29-F687-4f45-9708-019B960494DF}">
-                  <a14:hiddenLine xmlns="" xmlns:a14="http://schemas.microsoft.com/office/drawing/2010/main" w="9525">
+                  <a14:hiddenLine xmlns:a14="http://schemas.microsoft.com/office/drawing/2010/main" xmlns="" w="9525">
                     <a:solidFill>
                       <a:srgbClr val="000000"/>
                     </a:solidFill>
@@ -10495,7 +10497,7 @@
               </a:ln>
               <a:extLst>
                 <a:ext uri="{91240B29-F687-4f45-9708-019B960494DF}">
-                  <a14:hiddenLine xmlns="" xmlns:a14="http://schemas.microsoft.com/office/drawing/2010/main" w="9525">
+                  <a14:hiddenLine xmlns:a14="http://schemas.microsoft.com/office/drawing/2010/main" xmlns="" w="9525">
                     <a:solidFill>
                       <a:srgbClr val="000000"/>
                     </a:solidFill>
@@ -10560,7 +10562,7 @@
               </a:ln>
               <a:extLst>
                 <a:ext uri="{91240B29-F687-4f45-9708-019B960494DF}">
-                  <a14:hiddenLine xmlns="" xmlns:a14="http://schemas.microsoft.com/office/drawing/2010/main" w="9525">
+                  <a14:hiddenLine xmlns:a14="http://schemas.microsoft.com/office/drawing/2010/main" xmlns="" w="9525">
                     <a:solidFill>
                       <a:srgbClr val="000000"/>
                     </a:solidFill>
@@ -10622,7 +10624,7 @@
               </a:ln>
               <a:extLst>
                 <a:ext uri="{91240B29-F687-4f45-9708-019B960494DF}">
-                  <a14:hiddenLine xmlns="" xmlns:a14="http://schemas.microsoft.com/office/drawing/2010/main" w="9525">
+                  <a14:hiddenLine xmlns:a14="http://schemas.microsoft.com/office/drawing/2010/main" xmlns="" w="9525">
                     <a:solidFill>
                       <a:srgbClr val="000000"/>
                     </a:solidFill>
@@ -10712,7 +10714,7 @@
               </a:ln>
               <a:extLst>
                 <a:ext uri="{91240B29-F687-4f45-9708-019B960494DF}">
-                  <a14:hiddenLine xmlns="" xmlns:a14="http://schemas.microsoft.com/office/drawing/2010/main" w="9525">
+                  <a14:hiddenLine xmlns:a14="http://schemas.microsoft.com/office/drawing/2010/main" xmlns="" w="9525">
                     <a:solidFill>
                       <a:srgbClr val="000000"/>
                     </a:solidFill>
@@ -10802,7 +10804,7 @@
               </a:ln>
               <a:extLst>
                 <a:ext uri="{91240B29-F687-4f45-9708-019B960494DF}">
-                  <a14:hiddenLine xmlns="" xmlns:a14="http://schemas.microsoft.com/office/drawing/2010/main" w="9525">
+                  <a14:hiddenLine xmlns:a14="http://schemas.microsoft.com/office/drawing/2010/main" xmlns="" w="9525">
                     <a:solidFill>
                       <a:srgbClr val="000000"/>
                     </a:solidFill>
@@ -10867,7 +10869,7 @@
               </a:ln>
               <a:extLst>
                 <a:ext uri="{91240B29-F687-4f45-9708-019B960494DF}">
-                  <a14:hiddenLine xmlns="" xmlns:a14="http://schemas.microsoft.com/office/drawing/2010/main" w="9525">
+                  <a14:hiddenLine xmlns:a14="http://schemas.microsoft.com/office/drawing/2010/main" xmlns="" w="9525">
                     <a:solidFill>
                       <a:srgbClr val="000000"/>
                     </a:solidFill>
@@ -10987,7 +10989,7 @@
               </a:ln>
               <a:extLst>
                 <a:ext uri="{91240B29-F687-4f45-9708-019B960494DF}">
-                  <a14:hiddenLine xmlns="" xmlns:a14="http://schemas.microsoft.com/office/drawing/2010/main" w="9525">
+                  <a14:hiddenLine xmlns:a14="http://schemas.microsoft.com/office/drawing/2010/main" xmlns="" w="9525">
                     <a:solidFill>
                       <a:srgbClr val="000000"/>
                     </a:solidFill>
@@ -11085,7 +11087,7 @@
               </a:ln>
               <a:extLst>
                 <a:ext uri="{91240B29-F687-4f45-9708-019B960494DF}">
-                  <a14:hiddenLine xmlns="" xmlns:a14="http://schemas.microsoft.com/office/drawing/2010/main" w="9525">
+                  <a14:hiddenLine xmlns:a14="http://schemas.microsoft.com/office/drawing/2010/main" xmlns="" w="9525">
                     <a:solidFill>
                       <a:srgbClr val="000000"/>
                     </a:solidFill>
@@ -11200,7 +11202,7 @@
               </a:ln>
               <a:extLst>
                 <a:ext uri="{91240B29-F687-4f45-9708-019B960494DF}">
-                  <a14:hiddenLine xmlns="" xmlns:a14="http://schemas.microsoft.com/office/drawing/2010/main" w="9525">
+                  <a14:hiddenLine xmlns:a14="http://schemas.microsoft.com/office/drawing/2010/main" xmlns="" w="9525">
                     <a:solidFill>
                       <a:srgbClr val="000000"/>
                     </a:solidFill>
@@ -11290,7 +11292,7 @@
               </a:ln>
               <a:extLst>
                 <a:ext uri="{91240B29-F687-4f45-9708-019B960494DF}">
-                  <a14:hiddenLine xmlns="" xmlns:a14="http://schemas.microsoft.com/office/drawing/2010/main" w="9525">
+                  <a14:hiddenLine xmlns:a14="http://schemas.microsoft.com/office/drawing/2010/main" xmlns="" w="9525">
                     <a:solidFill>
                       <a:srgbClr val="000000"/>
                     </a:solidFill>
@@ -11355,7 +11357,7 @@
               </a:ln>
               <a:extLst>
                 <a:ext uri="{91240B29-F687-4f45-9708-019B960494DF}">
-                  <a14:hiddenLine xmlns="" xmlns:a14="http://schemas.microsoft.com/office/drawing/2010/main" w="9525">
+                  <a14:hiddenLine xmlns:a14="http://schemas.microsoft.com/office/drawing/2010/main" xmlns="" w="9525">
                     <a:solidFill>
                       <a:srgbClr val="000000"/>
                     </a:solidFill>
@@ -11445,7 +11447,7 @@
               </a:ln>
               <a:extLst>
                 <a:ext uri="{91240B29-F687-4f45-9708-019B960494DF}">
-                  <a14:hiddenLine xmlns="" xmlns:a14="http://schemas.microsoft.com/office/drawing/2010/main" w="9525">
+                  <a14:hiddenLine xmlns:a14="http://schemas.microsoft.com/office/drawing/2010/main" xmlns="" w="9525">
                     <a:solidFill>
                       <a:srgbClr val="000000"/>
                     </a:solidFill>
@@ -11513,7 +11515,7 @@
               </a:ln>
               <a:extLst>
                 <a:ext uri="{91240B29-F687-4f45-9708-019B960494DF}">
-                  <a14:hiddenLine xmlns="" xmlns:a14="http://schemas.microsoft.com/office/drawing/2010/main" w="9525">
+                  <a14:hiddenLine xmlns:a14="http://schemas.microsoft.com/office/drawing/2010/main" xmlns="" w="9525">
                     <a:solidFill>
                       <a:srgbClr val="000000"/>
                     </a:solidFill>
@@ -11603,7 +11605,7 @@
               </a:ln>
               <a:extLst>
                 <a:ext uri="{91240B29-F687-4f45-9708-019B960494DF}">
-                  <a14:hiddenLine xmlns="" xmlns:a14="http://schemas.microsoft.com/office/drawing/2010/main" w="9525">
+                  <a14:hiddenLine xmlns:a14="http://schemas.microsoft.com/office/drawing/2010/main" xmlns="" w="9525">
                     <a:solidFill>
                       <a:srgbClr val="000000"/>
                     </a:solidFill>
@@ -11671,7 +11673,7 @@
               </a:ln>
               <a:extLst>
                 <a:ext uri="{91240B29-F687-4f45-9708-019B960494DF}">
-                  <a14:hiddenLine xmlns="" xmlns:a14="http://schemas.microsoft.com/office/drawing/2010/main" w="9525">
+                  <a14:hiddenLine xmlns:a14="http://schemas.microsoft.com/office/drawing/2010/main" xmlns="" w="9525">
                     <a:solidFill>
                       <a:srgbClr val="000000"/>
                     </a:solidFill>
@@ -11761,7 +11763,7 @@
               </a:ln>
               <a:extLst>
                 <a:ext uri="{91240B29-F687-4f45-9708-019B960494DF}">
-                  <a14:hiddenLine xmlns="" xmlns:a14="http://schemas.microsoft.com/office/drawing/2010/main" w="9525">
+                  <a14:hiddenLine xmlns:a14="http://schemas.microsoft.com/office/drawing/2010/main" xmlns="" w="9525">
                     <a:solidFill>
                       <a:srgbClr val="000000"/>
                     </a:solidFill>
@@ -11795,7 +11797,7 @@
               </a:ln>
               <a:extLst>
                 <a:ext uri="{91240B29-F687-4f45-9708-019B960494DF}">
-                  <a14:hiddenLine xmlns="" xmlns:a14="http://schemas.microsoft.com/office/drawing/2010/main" w="9525">
+                  <a14:hiddenLine xmlns:a14="http://schemas.microsoft.com/office/drawing/2010/main" xmlns="" w="9525">
                     <a:solidFill>
                       <a:srgbClr val="000000"/>
                     </a:solidFill>
@@ -13068,6 +13070,245 @@
 </p:sld>
 </file>
 
+<file path=ppt/slides/slide6.xml><?xml version="1.0" encoding="utf-8"?>
+<p:sld xmlns:a="http://schemas.openxmlformats.org/drawingml/2006/main" xmlns:r="http://schemas.openxmlformats.org/officeDocument/2006/relationships" xmlns:p="http://schemas.openxmlformats.org/presentationml/2006/main">
+  <p:cSld>
+    <p:spTree>
+      <p:nvGrpSpPr>
+        <p:cNvPr id="1" name=""/>
+        <p:cNvGrpSpPr/>
+        <p:nvPr/>
+      </p:nvGrpSpPr>
+      <p:grpSpPr>
+        <a:xfrm>
+          <a:off x="0" y="0"/>
+          <a:ext cx="0" cy="0"/>
+          <a:chOff x="0" y="0"/>
+          <a:chExt cx="0" cy="0"/>
+        </a:xfrm>
+      </p:grpSpPr>
+      <p:sp>
+        <p:nvSpPr>
+          <p:cNvPr id="2" name="Title 1">
+            <a:extLst>
+              <a:ext uri="{FF2B5EF4-FFF2-40B4-BE49-F238E27FC236}">
+                <a16:creationId xmlns:a16="http://schemas.microsoft.com/office/drawing/2014/main" id="{E2AD2E21-A1BA-25A1-5E23-E768CB14BA5F}"/>
+              </a:ext>
+            </a:extLst>
+          </p:cNvPr>
+          <p:cNvSpPr>
+            <a:spLocks noGrp="1"/>
+          </p:cNvSpPr>
+          <p:nvPr>
+            <p:ph type="title"/>
+          </p:nvPr>
+        </p:nvSpPr>
+        <p:spPr>
+          <a:xfrm>
+            <a:off x="1141413" y="249402"/>
+            <a:ext cx="9905998" cy="448281"/>
+          </a:xfrm>
+        </p:spPr>
+        <p:txBody>
+          <a:bodyPr>
+            <a:normAutofit fontScale="90000"/>
+          </a:bodyPr>
+          <a:lstStyle/>
+          <a:p>
+            <a:r>
+              <a:rPr lang="en-US" dirty="0"/>
+              <a:t>questions</a:t>
+            </a:r>
+          </a:p>
+        </p:txBody>
+      </p:sp>
+      <p:sp>
+        <p:nvSpPr>
+          <p:cNvPr id="3" name="Content Placeholder 2">
+            <a:extLst>
+              <a:ext uri="{FF2B5EF4-FFF2-40B4-BE49-F238E27FC236}">
+                <a16:creationId xmlns:a16="http://schemas.microsoft.com/office/drawing/2014/main" id="{2B739BA1-BE93-BEDE-B090-4F21DCC400EB}"/>
+              </a:ext>
+            </a:extLst>
+          </p:cNvPr>
+          <p:cNvSpPr>
+            <a:spLocks noGrp="1"/>
+          </p:cNvSpPr>
+          <p:nvPr>
+            <p:ph idx="1"/>
+          </p:nvPr>
+        </p:nvSpPr>
+        <p:spPr>
+          <a:xfrm>
+            <a:off x="1141412" y="747856"/>
+            <a:ext cx="9905999" cy="5317384"/>
+          </a:xfrm>
+        </p:spPr>
+        <p:txBody>
+          <a:bodyPr>
+            <a:normAutofit/>
+          </a:bodyPr>
+          <a:lstStyle/>
+          <a:p>
+            <a:pPr marL="0" indent="0">
+              <a:buNone/>
+            </a:pPr>
+            <a:r>
+              <a:rPr lang="en-US" dirty="0"/>
+              <a:t>Questions:</a:t>
+            </a:r>
+          </a:p>
+          <a:p>
+            <a:pPr marL="457200" indent="-457200">
+              <a:buFont typeface="+mj-lt"/>
+              <a:buAutoNum type="arabicPeriod"/>
+            </a:pPr>
+            <a:r>
+              <a:rPr lang="en-US" dirty="0"/>
+              <a:t>I’m not sure I fully grasped the concept on the last question.  How does one use two variables to predict an outcome?  </a:t>
+            </a:r>
+          </a:p>
+          <a:p>
+            <a:pPr marL="457200" indent="-457200">
+              <a:buFont typeface="+mj-lt"/>
+              <a:buAutoNum type="arabicPeriod"/>
+            </a:pPr>
+            <a:r>
+              <a:rPr lang="en-US" dirty="0"/>
+              <a:t>Can you provide a real-world example of how this scheme would work?  In what industry might this be used?  And on what type of question might it answer?  I read the example of medical testing.  How might this be used in the oil and gas industry?</a:t>
+            </a:r>
+          </a:p>
+          <a:p>
+            <a:pPr marL="457200" indent="-457200">
+              <a:buFont typeface="+mj-lt"/>
+              <a:buAutoNum type="arabicPeriod"/>
+            </a:pPr>
+            <a:r>
+              <a:rPr lang="en-US" dirty="0"/>
+              <a:t>I got 100% accuracy on Part 2.  I can’t help but feel that may be an error.  I checked and rechecked the inputs and I believe I’ve done it correctly.  What are the odds of obtaining a 100% accuracy in “the real world?”  </a:t>
+            </a:r>
+          </a:p>
+          <a:p>
+            <a:pPr marL="457200" indent="-457200">
+              <a:buFont typeface="+mj-lt"/>
+              <a:buAutoNum type="arabicPeriod"/>
+            </a:pPr>
+            <a:endParaRPr lang="en-US" dirty="0"/>
+          </a:p>
+        </p:txBody>
+      </p:sp>
+    </p:spTree>
+    <p:extLst>
+      <p:ext uri="{BB962C8B-B14F-4D97-AF65-F5344CB8AC3E}">
+        <p14:creationId xmlns:p14="http://schemas.microsoft.com/office/powerpoint/2010/main" val="2292456404"/>
+      </p:ext>
+    </p:extLst>
+  </p:cSld>
+  <p:clrMapOvr>
+    <a:masterClrMapping/>
+  </p:clrMapOvr>
+</p:sld>
+</file>
+
+<file path=ppt/slides/slide7.xml><?xml version="1.0" encoding="utf-8"?>
+<p:sld xmlns:a="http://schemas.openxmlformats.org/drawingml/2006/main" xmlns:r="http://schemas.openxmlformats.org/officeDocument/2006/relationships" xmlns:p="http://schemas.openxmlformats.org/presentationml/2006/main">
+  <p:cSld>
+    <p:spTree>
+      <p:nvGrpSpPr>
+        <p:cNvPr id="1" name=""/>
+        <p:cNvGrpSpPr/>
+        <p:nvPr/>
+      </p:nvGrpSpPr>
+      <p:grpSpPr>
+        <a:xfrm>
+          <a:off x="0" y="0"/>
+          <a:ext cx="0" cy="0"/>
+          <a:chOff x="0" y="0"/>
+          <a:chExt cx="0" cy="0"/>
+        </a:xfrm>
+      </p:grpSpPr>
+      <p:sp>
+        <p:nvSpPr>
+          <p:cNvPr id="2" name="Title 1">
+            <a:extLst>
+              <a:ext uri="{FF2B5EF4-FFF2-40B4-BE49-F238E27FC236}">
+                <a16:creationId xmlns:a16="http://schemas.microsoft.com/office/drawing/2014/main" id="{845DA2D5-37CA-2CAA-6BAC-FC3228EF7147}"/>
+              </a:ext>
+            </a:extLst>
+          </p:cNvPr>
+          <p:cNvSpPr>
+            <a:spLocks noGrp="1"/>
+          </p:cNvSpPr>
+          <p:nvPr>
+            <p:ph type="title"/>
+          </p:nvPr>
+        </p:nvSpPr>
+        <p:spPr>
+          <a:xfrm>
+            <a:off x="1141413" y="173901"/>
+            <a:ext cx="9905998" cy="740499"/>
+          </a:xfrm>
+        </p:spPr>
+        <p:txBody>
+          <a:bodyPr/>
+          <a:lstStyle/>
+          <a:p>
+            <a:r>
+              <a:rPr lang="en-US" dirty="0"/>
+              <a:t>Key takeaways</a:t>
+            </a:r>
+          </a:p>
+        </p:txBody>
+      </p:sp>
+      <p:sp>
+        <p:nvSpPr>
+          <p:cNvPr id="3" name="Content Placeholder 2">
+            <a:extLst>
+              <a:ext uri="{FF2B5EF4-FFF2-40B4-BE49-F238E27FC236}">
+                <a16:creationId xmlns:a16="http://schemas.microsoft.com/office/drawing/2014/main" id="{633E59AE-2AB6-066E-CC49-CA36A26A6616}"/>
+              </a:ext>
+            </a:extLst>
+          </p:cNvPr>
+          <p:cNvSpPr>
+            <a:spLocks noGrp="1"/>
+          </p:cNvSpPr>
+          <p:nvPr>
+            <p:ph idx="1"/>
+          </p:nvPr>
+        </p:nvSpPr>
+        <p:spPr>
+          <a:xfrm>
+            <a:off x="1141412" y="924024"/>
+            <a:ext cx="9905999" cy="5577443"/>
+          </a:xfrm>
+        </p:spPr>
+        <p:txBody>
+          <a:bodyPr/>
+          <a:lstStyle/>
+          <a:p>
+            <a:r>
+              <a:rPr lang="en-US" dirty="0"/>
+              <a:t>This (machine learning) is why I am pursuing the data science degree.  I presume I can anticipate learning much more in machine learning 1 &amp; 2.  Are there any books out there or resources that might allow me to take a deep dive?  (guess this is actually a question)</a:t>
+            </a:r>
+          </a:p>
+          <a:p>
+            <a:endParaRPr lang="en-US" dirty="0"/>
+          </a:p>
+        </p:txBody>
+      </p:sp>
+    </p:spTree>
+    <p:extLst>
+      <p:ext uri="{BB962C8B-B14F-4D97-AF65-F5344CB8AC3E}">
+        <p14:creationId xmlns:p14="http://schemas.microsoft.com/office/powerpoint/2010/main" val="737418413"/>
+      </p:ext>
+    </p:extLst>
+  </p:cSld>
+  <p:clrMapOvr>
+    <a:masterClrMapping/>
+  </p:clrMapOvr>
+</p:sld>
+</file>
+
 <file path=ppt/theme/theme1.xml><?xml version="1.0" encoding="utf-8"?>
 <a:theme xmlns:a="http://schemas.openxmlformats.org/drawingml/2006/main" name="Circuit">
   <a:themeElements>

</xml_diff>